<commit_message>
presentation and video added
</commit_message>
<xml_diff>
--- a/STDISCM-Looking for Group Synchronization-Exconde-S14.pptx.pptx
+++ b/STDISCM-Looking for Group Synchronization-Exconde-S14.pptx.pptx
@@ -4130,7 +4130,7 @@
                 <a:cs typeface="TT Rounds Condensed"/>
                 <a:sym typeface="TT Rounds Condensed"/>
               </a:rPr>
-              <a:t>n: 2</a:t>
+              <a:t>n: 5</a:t>
             </a:r>
           </a:p>
           <a:p>
@@ -4151,7 +4151,7 @@
                 <a:cs typeface="TT Rounds Condensed"/>
                 <a:sym typeface="TT Rounds Condensed"/>
               </a:rPr>
-              <a:t>tanks: 3</a:t>
+              <a:t>tanks: 0</a:t>
             </a:r>
           </a:p>
           <a:p>
@@ -4172,7 +4172,7 @@
                 <a:cs typeface="TT Rounds Condensed"/>
                 <a:sym typeface="TT Rounds Condensed"/>
               </a:rPr>
-              <a:t>healers: 3</a:t>
+              <a:t>healers: 5</a:t>
             </a:r>
           </a:p>
           <a:p>
@@ -4193,7 +4193,7 @@
                 <a:cs typeface="TT Rounds Condensed"/>
                 <a:sym typeface="TT Rounds Condensed"/>
               </a:rPr>
-              <a:t>dps: 9</a:t>
+              <a:t>dps: 15</a:t>
             </a:r>
           </a:p>
           <a:p>
@@ -4214,7 +4214,7 @@
                 <a:cs typeface="TT Rounds Condensed"/>
                 <a:sym typeface="TT Rounds Condensed"/>
               </a:rPr>
-              <a:t>t1: 2</a:t>
+              <a:t>t1: 1</a:t>
             </a:r>
           </a:p>
           <a:p>
@@ -4730,7 +4730,7 @@
                 <a:cs typeface="TT Rounds Condensed"/>
                 <a:sym typeface="TT Rounds Condensed"/>
               </a:rPr>
-              <a:t>t2: 0</a:t>
+              <a:t>t2: -1</a:t>
             </a:r>
           </a:p>
           <a:p>

</xml_diff>